<commit_message>
Add to NB II
</commit_message>
<xml_diff>
--- a/docs/capacity_comparison.pptx
+++ b/docs/capacity_comparison.pptx
@@ -4139,6 +4139,96 @@
           <a:chExt cx="0" cy="0"/>
         </a:xfrm>
       </p:grpSpPr>
+      <p:pic>
+        <p:nvPicPr>
+          <p:cNvPr id="4" name="Picture 3">
+            <a:extLst>
+              <a:ext uri="{FF2B5EF4-FFF2-40B4-BE49-F238E27FC236}">
+                <a16:creationId xmlns:a16="http://schemas.microsoft.com/office/drawing/2014/main" id="{4488E00F-4711-524C-BEB6-2AAAFAF40DD5}"/>
+              </a:ext>
+            </a:extLst>
+          </p:cNvPr>
+          <p:cNvPicPr>
+            <a:picLocks noChangeAspect="1"/>
+          </p:cNvPicPr>
+          <p:nvPr/>
+        </p:nvPicPr>
+        <p:blipFill>
+          <a:blip r:embed="rId2"/>
+          <a:stretch>
+            <a:fillRect/>
+          </a:stretch>
+        </p:blipFill>
+        <p:spPr>
+          <a:xfrm>
+            <a:off x="0" y="0"/>
+            <a:ext cx="7200000" cy="2879380"/>
+          </a:xfrm>
+          <a:prstGeom prst="rect">
+            <a:avLst/>
+          </a:prstGeom>
+        </p:spPr>
+      </p:pic>
+      <p:pic>
+        <p:nvPicPr>
+          <p:cNvPr id="5" name="Picture 4">
+            <a:extLst>
+              <a:ext uri="{FF2B5EF4-FFF2-40B4-BE49-F238E27FC236}">
+                <a16:creationId xmlns:a16="http://schemas.microsoft.com/office/drawing/2014/main" id="{718F6BD1-9E09-9244-8A4E-43F1484B708D}"/>
+              </a:ext>
+            </a:extLst>
+          </p:cNvPr>
+          <p:cNvPicPr>
+            <a:picLocks noChangeAspect="1"/>
+          </p:cNvPicPr>
+          <p:nvPr/>
+        </p:nvPicPr>
+        <p:blipFill>
+          <a:blip r:embed="rId3"/>
+          <a:stretch>
+            <a:fillRect/>
+          </a:stretch>
+        </p:blipFill>
+        <p:spPr>
+          <a:xfrm>
+            <a:off x="0" y="5758760"/>
+            <a:ext cx="7200000" cy="2879380"/>
+          </a:xfrm>
+          <a:prstGeom prst="rect">
+            <a:avLst/>
+          </a:prstGeom>
+        </p:spPr>
+      </p:pic>
+      <p:pic>
+        <p:nvPicPr>
+          <p:cNvPr id="6" name="Picture 5">
+            <a:extLst>
+              <a:ext uri="{FF2B5EF4-FFF2-40B4-BE49-F238E27FC236}">
+                <a16:creationId xmlns:a16="http://schemas.microsoft.com/office/drawing/2014/main" id="{6C2C741C-9AE1-CD49-92D7-6F4B6CA8B6E5}"/>
+              </a:ext>
+            </a:extLst>
+          </p:cNvPr>
+          <p:cNvPicPr>
+            <a:picLocks noChangeAspect="1"/>
+          </p:cNvPicPr>
+          <p:nvPr/>
+        </p:nvPicPr>
+        <p:blipFill>
+          <a:blip r:embed="rId4"/>
+          <a:stretch>
+            <a:fillRect/>
+          </a:stretch>
+        </p:blipFill>
+        <p:spPr>
+          <a:xfrm>
+            <a:off x="0" y="2879380"/>
+            <a:ext cx="7200000" cy="2879380"/>
+          </a:xfrm>
+          <a:prstGeom prst="rect">
+            <a:avLst/>
+          </a:prstGeom>
+        </p:spPr>
+      </p:pic>
     </p:spTree>
     <p:extLst>
       <p:ext uri="{BB962C8B-B14F-4D97-AF65-F5344CB8AC3E}">

</xml_diff>